<commit_message>
added git info to presentation
</commit_message>
<xml_diff>
--- a/lections/1/cpp_craft_intro.pptx
+++ b/lections/1/cpp_craft_intro.pptx
@@ -3088,11 +3088,7 @@
             </a:r>
             <a:r>
               <a:rPr lang="en-US" dirty="0" smtClean="0"/>
-              <a:t>Craft: </a:t>
-            </a:r>
-            <a:r>
-              <a:rPr lang="en-US" dirty="0" smtClean="0"/>
-              <a:t>Intro</a:t>
+              <a:t>Craft: Intro</a:t>
             </a:r>
             <a:endParaRPr lang="en-US" dirty="0"/>
           </a:p>
@@ -3721,7 +3717,7 @@
         </p:spPr>
         <p:txBody>
           <a:bodyPr>
-            <a:normAutofit fontScale="77500" lnSpcReduction="20000"/>
+            <a:normAutofit fontScale="70000" lnSpcReduction="20000"/>
           </a:bodyPr>
           <a:lstStyle/>
           <a:p>
@@ -3772,6 +3768,44 @@
                 </a:schemeClr>
               </a:solidFill>
             </a:endParaRPr>
+          </a:p>
+          <a:p>
+            <a:r>
+              <a:rPr lang="ru-RU" dirty="0" smtClean="0"/>
+              <a:t>Выполнить инс</a:t>
+            </a:r>
+            <a:r>
+              <a:rPr lang="ru-RU" dirty="0" smtClean="0"/>
+              <a:t>т</a:t>
+            </a:r>
+            <a:r>
+              <a:rPr lang="ru-RU" dirty="0" smtClean="0"/>
+              <a:t>рукции описанные в </a:t>
+            </a:r>
+            <a:r>
+              <a:rPr lang="en-US" dirty="0" smtClean="0"/>
+              <a:t>readme.md: </a:t>
+            </a:r>
+            <a:r>
+              <a:rPr lang="ru-RU" dirty="0" smtClean="0"/>
+              <a:t>создать свой каталог, добавить </a:t>
+            </a:r>
+            <a:r>
+              <a:rPr lang="en-US" dirty="0" smtClean="0"/>
+              <a:t>readme.txt</a:t>
+            </a:r>
+            <a:r>
+              <a:rPr lang="ru-RU" dirty="0" smtClean="0"/>
+              <a:t>, добавить в </a:t>
+            </a:r>
+            <a:r>
+              <a:rPr lang="en-US" dirty="0" err="1" smtClean="0"/>
+              <a:t>skype</a:t>
+            </a:r>
+            <a:r>
+              <a:rPr lang="en-US" dirty="0" smtClean="0"/>
+              <a:t> imorozov87.</a:t>
+            </a:r>
           </a:p>
           <a:p>
             <a:endParaRPr lang="en-US" b="1" dirty="0" smtClean="0">

</xml_diff>

<commit_message>
changed encoding of tasks/readme.md
</commit_message>
<xml_diff>
--- a/lections/1/cpp_craft_intro.pptx
+++ b/lections/1/cpp_craft_intro.pptx
@@ -3717,7 +3717,7 @@
         </p:spPr>
         <p:txBody>
           <a:bodyPr>
-            <a:normAutofit fontScale="62500" lnSpcReduction="20000"/>
+            <a:normAutofit fontScale="55000" lnSpcReduction="20000"/>
           </a:bodyPr>
           <a:lstStyle/>
           <a:p>
@@ -3770,18 +3770,7 @@
                 </a:solidFill>
                 <a:hlinkClick r:id="rId2"/>
               </a:rPr>
-              <a:t>https://</a:t>
-            </a:r>
-            <a:r>
-              <a:rPr lang="en-US" b="1" dirty="0" smtClean="0">
-                <a:solidFill>
-                  <a:schemeClr val="accent2">
-                    <a:lumMod val="75000"/>
-                  </a:schemeClr>
-                </a:solidFill>
-                <a:hlinkClick r:id="rId2"/>
-              </a:rPr>
-              <a:t>github.com/marozau/cpp_craft_0314</a:t>
+              <a:t>https://github.com/marozau/cpp_craft_0314</a:t>
             </a:r>
             <a:endParaRPr lang="en-US" b="1" dirty="0" smtClean="0">
               <a:solidFill>
@@ -3810,17 +3799,7 @@
                   </a:schemeClr>
                 </a:solidFill>
               </a:rPr>
-              <a:t> </a:t>
-            </a:r>
-            <a:r>
-              <a:rPr lang="en-US" b="1" dirty="0" smtClean="0">
-                <a:solidFill>
-                  <a:schemeClr val="accent2">
-                    <a:lumMod val="75000"/>
-                  </a:schemeClr>
-                </a:solidFill>
-              </a:rPr>
-              <a:t>clone </a:t>
+              <a:t> clone </a:t>
             </a:r>
             <a:r>
               <a:rPr lang="en-US" b="1" dirty="0" smtClean="0">
@@ -3831,7 +3810,18 @@
                 </a:solidFill>
                 <a:hlinkClick r:id="rId3"/>
               </a:rPr>
-              <a:t>https://</a:t>
+              <a:t>https://github.com/&lt; </a:t>
+            </a:r>
+            <a:r>
+              <a:rPr lang="en-US" b="1" dirty="0" err="1" smtClean="0">
+                <a:solidFill>
+                  <a:schemeClr val="accent2">
+                    <a:lumMod val="75000"/>
+                  </a:schemeClr>
+                </a:solidFill>
+                <a:hlinkClick r:id="rId3"/>
+              </a:rPr>
+              <a:t>github_user_name</a:t>
             </a:r>
             <a:r>
               <a:rPr lang="en-US" b="1" dirty="0" smtClean="0">
@@ -3842,51 +3832,7 @@
                 </a:solidFill>
                 <a:hlinkClick r:id="rId3"/>
               </a:rPr>
-              <a:t>github.com/</a:t>
-            </a:r>
-            <a:r>
-              <a:rPr lang="en-US" b="1" dirty="0" smtClean="0">
-                <a:solidFill>
-                  <a:schemeClr val="accent2">
-                    <a:lumMod val="75000"/>
-                  </a:schemeClr>
-                </a:solidFill>
-                <a:hlinkClick r:id="rId3"/>
-              </a:rPr>
-              <a:t>&lt; </a:t>
-            </a:r>
-            <a:r>
-              <a:rPr lang="en-US" b="1" smtClean="0">
-                <a:solidFill>
-                  <a:schemeClr val="accent2">
-                    <a:lumMod val="75000"/>
-                  </a:schemeClr>
-                </a:solidFill>
-                <a:hlinkClick r:id="rId3"/>
-              </a:rPr>
-              <a:t>github_user_name</a:t>
-            </a:r>
-            <a:r>
-              <a:rPr lang="en-US" b="1" dirty="0" smtClean="0">
-                <a:solidFill>
-                  <a:schemeClr val="accent2">
-                    <a:lumMod val="75000"/>
-                  </a:schemeClr>
-                </a:solidFill>
-                <a:hlinkClick r:id="rId3"/>
-              </a:rPr>
-              <a:t>&gt;</a:t>
-            </a:r>
-            <a:r>
-              <a:rPr lang="en-US" b="1" dirty="0" smtClean="0">
-                <a:solidFill>
-                  <a:schemeClr val="accent2">
-                    <a:lumMod val="75000"/>
-                  </a:schemeClr>
-                </a:solidFill>
-                <a:hlinkClick r:id="rId3"/>
-              </a:rPr>
-              <a:t>/cpp_craft_0314.git</a:t>
+              <a:t>&gt;/cpp_craft_0314.git</a:t>
             </a:r>
             <a:endParaRPr lang="en-US" b="1" dirty="0" smtClean="0">
               <a:solidFill>
@@ -3963,7 +3909,79 @@
                   </a:schemeClr>
                 </a:solidFill>
               </a:rPr>
-              <a:t> commit –a –m “description”</a:t>
+              <a:t> add &lt;</a:t>
+            </a:r>
+            <a:r>
+              <a:rPr lang="en-US" b="1" dirty="0" err="1" smtClean="0">
+                <a:solidFill>
+                  <a:schemeClr val="accent2">
+                    <a:lumMod val="75000"/>
+                  </a:schemeClr>
+                </a:solidFill>
+              </a:rPr>
+              <a:t>your_working</a:t>
+            </a:r>
+            <a:r>
+              <a:rPr lang="en-US" b="1" dirty="0" err="1" smtClean="0">
+                <a:solidFill>
+                  <a:schemeClr val="accent2">
+                    <a:lumMod val="75000"/>
+                  </a:schemeClr>
+                </a:solidFill>
+              </a:rPr>
+              <a:t>_</a:t>
+            </a:r>
+            <a:r>
+              <a:rPr lang="en-US" b="1" dirty="0" err="1" smtClean="0">
+                <a:solidFill>
+                  <a:schemeClr val="accent2">
+                    <a:lumMod val="75000"/>
+                  </a:schemeClr>
+                </a:solidFill>
+              </a:rPr>
+              <a:t>folders_and_files</a:t>
+            </a:r>
+            <a:r>
+              <a:rPr lang="en-US" b="1" dirty="0" smtClean="0">
+                <a:solidFill>
+                  <a:schemeClr val="accent2">
+                    <a:lumMod val="75000"/>
+                  </a:schemeClr>
+                </a:solidFill>
+              </a:rPr>
+              <a:t>&gt;</a:t>
+            </a:r>
+          </a:p>
+          <a:p>
+            <a:r>
+              <a:rPr lang="en-US" b="1" dirty="0" err="1" smtClean="0">
+                <a:solidFill>
+                  <a:schemeClr val="accent2">
+                    <a:lumMod val="75000"/>
+                  </a:schemeClr>
+                </a:solidFill>
+              </a:rPr>
+              <a:t>git</a:t>
+            </a:r>
+            <a:r>
+              <a:rPr lang="en-US" b="1" dirty="0" smtClean="0">
+                <a:solidFill>
+                  <a:schemeClr val="accent2">
+                    <a:lumMod val="75000"/>
+                  </a:schemeClr>
+                </a:solidFill>
+              </a:rPr>
+              <a:t> </a:t>
+            </a:r>
+            <a:r>
+              <a:rPr lang="en-US" b="1" dirty="0" smtClean="0">
+                <a:solidFill>
+                  <a:schemeClr val="accent2">
+                    <a:lumMod val="75000"/>
+                  </a:schemeClr>
+                </a:solidFill>
+              </a:rPr>
+              <a:t>commit –a –m “description”</a:t>
             </a:r>
           </a:p>
           <a:p>

</xml_diff>